<commit_message>
refactor: Reorganize scripts into 'scripts/' directory and fix path dependencies
</commit_message>
<xml_diff>
--- a/output/02_fertilization.pptx
+++ b/output/02_fertilization.pptx
@@ -14,7 +14,6 @@
     <p:sldId id="262" r:id="rId13"/>
     <p:sldId id="263" r:id="rId14"/>
     <p:sldId id="264" r:id="rId15"/>
-    <p:sldId id="265" r:id="rId16"/>
   </p:sldIdLst>
   <p:sldSz cx="9144000" cy="6858000" type="screen4x3"/>
   <p:notesSz cx="6858000" cy="9144000"/>
@@ -3147,86 +3146,6 @@
 </p:sld>
 </file>
 
-<file path=ppt/slides/slide10.xml><?xml version="1.0" encoding="utf-8"?>
-<p:sld xmlns:a="http://schemas.openxmlformats.org/drawingml/2006/main" xmlns:p="http://schemas.openxmlformats.org/presentationml/2006/main" xmlns:r="http://schemas.openxmlformats.org/officeDocument/2006/relationships">
-  <p:cSld>
-    <p:spTree>
-      <p:nvGrpSpPr>
-        <p:cNvPr id="1" name=""/>
-        <p:cNvGrpSpPr/>
-        <p:nvPr/>
-      </p:nvGrpSpPr>
-      <p:grpSpPr/>
-      <p:sp>
-        <p:nvSpPr>
-          <p:cNvPr id="2" name="Title 1"/>
-          <p:cNvSpPr>
-            <a:spLocks noGrp="1"/>
-          </p:cNvSpPr>
-          <p:nvPr>
-            <p:ph type="title"/>
-          </p:nvPr>
-        </p:nvSpPr>
-        <p:spPr/>
-        <p:txBody>
-          <a:bodyPr/>
-          <a:lstStyle/>
-          <a:p>
-            <a:r>
-              <a:t>핵심 정리 📝</a:t>
-            </a:r>
-          </a:p>
-        </p:txBody>
-      </p:sp>
-      <p:sp>
-        <p:nvSpPr>
-          <p:cNvPr id="3" name="Content Placeholder 2"/>
-          <p:cNvSpPr>
-            <a:spLocks noGrp="1"/>
-          </p:cNvSpPr>
-          <p:nvPr>
-            <p:ph idx="1"/>
-          </p:nvPr>
-        </p:nvSpPr>
-        <p:spPr/>
-        <p:txBody>
-          <a:bodyPr/>
-          <a:lstStyle/>
-          <a:p/>
-          <a:p>
-            <a:pPr/>
-            <a:r>
-              <a:t>수정은 수란관에서 정자와 난자가 결합하는 것이다.</a:t>
-            </a:r>
-          </a:p>
-          <a:p>
-            <a:pPr/>
-            <a:r>
-              <a:t>난할은 세포 생장 없이 빠르게 분열하여 전체 크기가 일정하다.</a:t>
-            </a:r>
-          </a:p>
-          <a:p>
-            <a:pPr/>
-            <a:r>
-              <a:t>배아가 자궁 내막에 착상하면 임신이 시작된다.</a:t>
-            </a:r>
-          </a:p>
-          <a:p>
-            <a:pPr/>
-            <a:r>
-              <a:t>태반을 통해 모체로부터 영양소와 산소를 공급받는다.</a:t>
-            </a:r>
-          </a:p>
-        </p:txBody>
-      </p:sp>
-    </p:spTree>
-  </p:cSld>
-  <p:clrMapOvr>
-    <a:masterClrMapping/>
-  </p:clrMapOvr>
-</p:sld>
-</file>
-
 <file path=ppt/slides/slide2.xml><?xml version="1.0" encoding="utf-8"?>
 <p:sld xmlns:a="http://schemas.openxmlformats.org/drawingml/2006/main" xmlns:p="http://schemas.openxmlformats.org/presentationml/2006/main" xmlns:r="http://schemas.openxmlformats.org/officeDocument/2006/relationships">
   <p:cSld>
@@ -3455,23 +3374,7 @@
           <a:bodyPr/>
           <a:lstStyle/>
           <a:p/>
-          <a:p>
-            <a:r>
-              <a:t>&lt;div class="flex justify-center"&gt;</a:t>
-            </a:r>
-            <a:br/>
-            <a:r>
-              <a:t>  &lt;img src="/images/gametes1_med.jpeg" class="rounded-xl shadow-lg max-w-2xl w-full" /&gt;</a:t>
-            </a:r>
-            <a:br/>
-            <a:r>
-              <a:t>&lt;/div&gt;</a:t>
-            </a:r>
-            <a:br/>
-            <a:r>
-              <a:t>&lt;p class="text-center mt-4 text-slate-500"&gt;각자의 역할(이동 vs 양분)에 최적화된 구조&lt;/p&gt;</a:t>
-            </a:r>
-          </a:p>
+          <a:p/>
         </p:txBody>
       </p:sp>
     </p:spTree>
@@ -3528,39 +3431,7 @@
           <a:bodyPr/>
           <a:lstStyle/>
           <a:p/>
-          <a:p>
-            <a:r>
-              <a:t>&lt;div class="bg-white p-6 rounded-xl border-l-4 border-amber-500"&gt;</a:t>
-            </a:r>
-            <a:br/>
-            <a:r>
-              <a:t>  &lt;h3 class="font-bold text-xl mb-2 text-amber-800"&gt;정의&lt;/h3&gt;</a:t>
-            </a:r>
-            <a:br/>
-            <a:r>
-              <a:t>  &lt;p class="text-lg mb-4"&gt;정자와 난자가 결합하여 수정란이 되는 과정&lt;/p&gt;</a:t>
-            </a:r>
-            <a:br/>
-            <a:r>
-              <a:t>  &lt;ul class="list-disc list-inside text-lg"&gt;</a:t>
-            </a:r>
-            <a:br/>
-            <a:r>
-              <a:t>    &lt;li&gt;장소: 수란관 상단부&lt;/li&gt;</a:t>
-            </a:r>
-            <a:br/>
-            <a:r>
-              <a:t>    &lt;li&gt;결과: 체세포와 같은 염색체 수 회복 (n + n = 2n)&lt;/li&gt;</a:t>
-            </a:r>
-            <a:br/>
-            <a:r>
-              <a:t>  &lt;/ul&gt;</a:t>
-            </a:r>
-            <a:br/>
-            <a:r>
-              <a:t>&lt;/div&gt;</a:t>
-            </a:r>
-          </a:p>
+          <a:p/>
           <a:p>
             <a:pPr lvl="1"/>
             <a:r>
@@ -3623,39 +3494,7 @@
           <a:bodyPr/>
           <a:lstStyle/>
           <a:p/>
-          <a:p>
-            <a:r>
-              <a:t>&lt;div class="bg-indigo-50 p-6 rounded-xl"&gt;</a:t>
-            </a:r>
-            <a:br/>
-            <a:r>
-              <a:t>  &lt;h3 class="font-bold text-xl mb-2 text-indigo-800"&gt;특징&lt;/h3&gt;</a:t>
-            </a:r>
-            <a:br/>
-            <a:r>
-              <a:t>  &lt;ul class="space-y-2 text-lg"&gt;</a:t>
-            </a:r>
-            <a:br/>
-            <a:r>
-              <a:t>    &lt;li&gt;빠른 분열: 세포 생장기(간기)가 거의 없음&lt;/li&gt;</a:t>
-            </a:r>
-            <a:br/>
-            <a:r>
-              <a:t>    &lt;li&gt;세포 크기: 분열할수록 작아짐 (할구)&lt;/li&gt;</a:t>
-            </a:r>
-            <a:br/>
-            <a:r>
-              <a:t>    &lt;li&gt;전체 크기: 수정란과 거의 동일하게 유지&lt;/li&gt;</a:t>
-            </a:r>
-            <a:br/>
-            <a:r>
-              <a:t>  &lt;/ul&gt;</a:t>
-            </a:r>
-            <a:br/>
-            <a:r>
-              <a:t>&lt;/div&gt;</a:t>
-            </a:r>
-          </a:p>
+          <a:p/>
           <a:p>
             <a:pPr lvl="1"/>
             <a:r>
@@ -3858,47 +3697,7 @@
           <a:bodyPr/>
           <a:lstStyle/>
           <a:p/>
-          <a:p>
-            <a:r>
-              <a:t>&lt;div class="grid grid-cols-3 gap-4"&gt;</a:t>
-            </a:r>
-            <a:br/>
-            <a:r>
-              <a:t>  &lt;div class="bg-white p-4 rounded-xl shadow-md"&gt;</a:t>
-            </a:r>
-            <a:br/>
-            <a:r>
-              <a:t>    &lt;img src="/images/fetus_11_weeks.jpg" class="rounded-lg h-40 w-full object-cover mb-2"/&gt;</a:t>
-            </a:r>
-            <a:br/>
-            <a:r>
-              <a:t>    &lt;h4 class="font-bold text-center"&gt;초기 (11주)&lt;/h4&gt;</a:t>
-            </a:r>
-            <a:br/>
-            <a:r>
-              <a:t>    &lt;p class="text-sm text-center"&gt;주요 기관 형성, 사람 모습 갖춤&lt;/p&gt;</a:t>
-            </a:r>
-            <a:br/>
-            <a:r>
-              <a:t>  &lt;/div&gt;</a:t>
-            </a:r>
-            <a:br/>
-            <a:r>
-              <a:t>  &lt;div class="bg-white p-4 rounded-xl shadow-md"&gt;</a:t>
-            </a:r>
-            <a:br/>
-            <a:r>
-              <a:t>    &lt;img src="/images/fetus_21_weeks.jpg" class="rounded-lg h-40 w-full object-cover mb-2"/&gt;</a:t>
-            </a:r>
-            <a:br/>
-            <a:r>
-              <a:t>    &lt;h4 class="font-bold text-center"&gt;중기 (21주)&lt;/h4&gt;</a:t>
-            </a:r>
-            <a:br/>
-            <a:r>
-              <a:t>    &lt;p</a:t>
-            </a:r>
-          </a:p>
+          <a:p/>
         </p:txBody>
       </p:sp>
     </p:spTree>

</xml_diff>